<commit_message>
Adding presentations for mocking libraries and frameworks
</commit_message>
<xml_diff>
--- a/presentations/Test Doubles.pptx
+++ b/presentations/Test Doubles.pptx
@@ -3761,7 +3761,10 @@
           <a:bodyPr/>
           <a:lstStyle/>
           <a:p>
-            <a:endParaRPr lang="en-US"/>
+            <a:r>
+              <a:rPr lang="en-US" dirty="0"/>
+              <a:t>References</a:t>
+            </a:r>
           </a:p>
         </p:txBody>
       </p:sp>
@@ -3786,7 +3789,66 @@
           <a:bodyPr/>
           <a:lstStyle/>
           <a:p>
-            <a:endParaRPr lang="en-US"/>
+            <a:r>
+              <a:rPr lang="en-US" dirty="0" err="1"/>
+              <a:t>xUnit</a:t>
+            </a:r>
+            <a:r>
+              <a:rPr lang="en-US" dirty="0"/>
+              <a:t> Patterns: </a:t>
+            </a:r>
+            <a:r>
+              <a:rPr lang="en-US" dirty="0">
+                <a:hlinkClick r:id="rId2"/>
+              </a:rPr>
+              <a:t>http://www.xunitpatterns.com</a:t>
+            </a:r>
+            <a:endParaRPr lang="en-US" dirty="0"/>
+          </a:p>
+          <a:p>
+            <a:r>
+              <a:rPr lang="en-US" dirty="0"/>
+              <a:t>Mockito: </a:t>
+            </a:r>
+            <a:r>
+              <a:rPr lang="en-US" dirty="0">
+                <a:hlinkClick r:id="rId3"/>
+              </a:rPr>
+              <a:t>https://site.mockito.org</a:t>
+            </a:r>
+            <a:endParaRPr lang="en-US" dirty="0"/>
+          </a:p>
+          <a:p>
+            <a:r>
+              <a:rPr lang="en-US" dirty="0"/>
+              <a:t>Jasmine: </a:t>
+            </a:r>
+            <a:r>
+              <a:rPr lang="en-US" dirty="0">
+                <a:hlinkClick r:id="rId4"/>
+              </a:rPr>
+              <a:t>https://jasmine.github.io</a:t>
+            </a:r>
+            <a:endParaRPr lang="en-US" dirty="0"/>
+          </a:p>
+          <a:p>
+            <a:r>
+              <a:rPr lang="en-US" dirty="0"/>
+              <a:t>Jest: </a:t>
+            </a:r>
+            <a:r>
+              <a:rPr lang="en-US" dirty="0">
+                <a:hlinkClick r:id="rId5"/>
+              </a:rPr>
+              <a:t>https://jestjs.io/docs/mock-functions</a:t>
+            </a:r>
+            <a:endParaRPr lang="en-US" dirty="0"/>
+          </a:p>
+          <a:p>
+            <a:endParaRPr lang="en-US" dirty="0"/>
+          </a:p>
+          <a:p>
+            <a:endParaRPr lang="en-US" dirty="0"/>
           </a:p>
         </p:txBody>
       </p:sp>
@@ -4088,7 +4150,15 @@
           <a:p>
             <a:r>
               <a:rPr lang="en-US" dirty="0"/>
-              <a:t>Used to replace a real component on which the system under test (SUT) depends so that the test has a control point for indirect inputs of the SUT.</a:t>
+              <a:t>Used to replace a real component on which the system under test (SUT) depends so that the test has a control point for </a:t>
+            </a:r>
+            <a:r>
+              <a:rPr lang="en-US" i="1" dirty="0"/>
+              <a:t>indirect inputs </a:t>
+            </a:r>
+            <a:r>
+              <a:rPr lang="en-US" dirty="0"/>
+              <a:t>of the SUT.</a:t>
             </a:r>
           </a:p>
           <a:p>
@@ -4238,7 +4308,22 @@
           <a:p>
             <a:r>
               <a:rPr lang="en-US" dirty="0"/>
-              <a:t> Still retains the ability of the test stub to return values or raise exceptions.</a:t>
+              <a:t> Still retains the ability to control the </a:t>
+            </a:r>
+            <a:r>
+              <a:rPr lang="en-US" i="1" dirty="0"/>
+              <a:t>indirect inputs </a:t>
+            </a:r>
+            <a:r>
+              <a:rPr lang="en-US" dirty="0"/>
+              <a:t>of the SUT</a:t>
+            </a:r>
+          </a:p>
+          <a:p>
+            <a:pPr lvl="1"/>
+            <a:r>
+              <a:rPr lang="en-US" dirty="0"/>
+              <a:t>Specify that the spy return values or raise exceptions.</a:t>
             </a:r>
           </a:p>
         </p:txBody>
@@ -4454,13 +4539,8 @@
           <a:p>
             <a:r>
               <a:rPr lang="en-US" dirty="0"/>
-              <a:t>Used when real dependencies are slow or hard to control </a:t>
-            </a:r>
-            <a:r>
-              <a:rPr lang="en-US"/>
-              <a:t>for testing.</a:t>
-            </a:r>
-            <a:endParaRPr lang="en-US" dirty="0"/>
+              <a:t>Used when real dependencies are slow or hard to control for testing.</a:t>
+            </a:r>
           </a:p>
         </p:txBody>
       </p:sp>

</xml_diff>

<commit_message>
Updates to Test Doubles presentation
</commit_message>
<xml_diff>
--- a/presentations/Test Doubles.pptx
+++ b/presentations/Test Doubles.pptx
@@ -9,16 +9,13 @@
     <p:sldId id="257" r:id="rId3"/>
     <p:sldId id="258" r:id="rId4"/>
     <p:sldId id="259" r:id="rId5"/>
-    <p:sldId id="260" r:id="rId6"/>
-    <p:sldId id="261" r:id="rId7"/>
-    <p:sldId id="262" r:id="rId8"/>
+    <p:sldId id="262" r:id="rId6"/>
+    <p:sldId id="260" r:id="rId7"/>
+    <p:sldId id="261" r:id="rId8"/>
     <p:sldId id="263" r:id="rId9"/>
     <p:sldId id="264" r:id="rId10"/>
-    <p:sldId id="265" r:id="rId11"/>
-    <p:sldId id="266" r:id="rId12"/>
-    <p:sldId id="267" r:id="rId13"/>
-    <p:sldId id="268" r:id="rId14"/>
-    <p:sldId id="269" r:id="rId15"/>
+    <p:sldId id="270" r:id="rId11"/>
+    <p:sldId id="269" r:id="rId12"/>
   </p:sldIdLst>
   <p:sldSz cx="12192000" cy="6858000"/>
   <p:notesSz cx="6858000" cy="9144000"/>
@@ -117,6 +114,11 @@
       </a:defRPr>
     </a:lvl9pPr>
   </p:defaultTextStyle>
+  <p:extLst>
+    <p:ext uri="{EFAFB233-063F-42B5-8137-9DF3F51BA10A}">
+      <p15:sldGuideLst xmlns:p15="http://schemas.microsoft.com/office/powerpoint/2012/main"/>
+    </p:ext>
+  </p:extLst>
 </p:presentation>
 </file>
 
@@ -267,7 +269,7 @@
           <a:p>
             <a:fld id="{B051A233-554D-9E4F-B676-5FA9AA940918}" type="datetimeFigureOut">
               <a:rPr lang="en-US" smtClean="0"/>
-              <a:t>8/7/21</a:t>
+              <a:t>8/11/21</a:t>
             </a:fld>
             <a:endParaRPr lang="en-US"/>
           </a:p>
@@ -465,7 +467,7 @@
           <a:p>
             <a:fld id="{B051A233-554D-9E4F-B676-5FA9AA940918}" type="datetimeFigureOut">
               <a:rPr lang="en-US" smtClean="0"/>
-              <a:t>8/7/21</a:t>
+              <a:t>8/11/21</a:t>
             </a:fld>
             <a:endParaRPr lang="en-US"/>
           </a:p>
@@ -673,7 +675,7 @@
           <a:p>
             <a:fld id="{B051A233-554D-9E4F-B676-5FA9AA940918}" type="datetimeFigureOut">
               <a:rPr lang="en-US" smtClean="0"/>
-              <a:t>8/7/21</a:t>
+              <a:t>8/11/21</a:t>
             </a:fld>
             <a:endParaRPr lang="en-US"/>
           </a:p>
@@ -871,7 +873,7 @@
           <a:p>
             <a:fld id="{B051A233-554D-9E4F-B676-5FA9AA940918}" type="datetimeFigureOut">
               <a:rPr lang="en-US" smtClean="0"/>
-              <a:t>8/7/21</a:t>
+              <a:t>8/11/21</a:t>
             </a:fld>
             <a:endParaRPr lang="en-US"/>
           </a:p>
@@ -1146,7 +1148,7 @@
           <a:p>
             <a:fld id="{B051A233-554D-9E4F-B676-5FA9AA940918}" type="datetimeFigureOut">
               <a:rPr lang="en-US" smtClean="0"/>
-              <a:t>8/7/21</a:t>
+              <a:t>8/11/21</a:t>
             </a:fld>
             <a:endParaRPr lang="en-US"/>
           </a:p>
@@ -1411,7 +1413,7 @@
           <a:p>
             <a:fld id="{B051A233-554D-9E4F-B676-5FA9AA940918}" type="datetimeFigureOut">
               <a:rPr lang="en-US" smtClean="0"/>
-              <a:t>8/7/21</a:t>
+              <a:t>8/11/21</a:t>
             </a:fld>
             <a:endParaRPr lang="en-US"/>
           </a:p>
@@ -1823,7 +1825,7 @@
           <a:p>
             <a:fld id="{B051A233-554D-9E4F-B676-5FA9AA940918}" type="datetimeFigureOut">
               <a:rPr lang="en-US" smtClean="0"/>
-              <a:t>8/7/21</a:t>
+              <a:t>8/11/21</a:t>
             </a:fld>
             <a:endParaRPr lang="en-US"/>
           </a:p>
@@ -1964,7 +1966,7 @@
           <a:p>
             <a:fld id="{B051A233-554D-9E4F-B676-5FA9AA940918}" type="datetimeFigureOut">
               <a:rPr lang="en-US" smtClean="0"/>
-              <a:t>8/7/21</a:t>
+              <a:t>8/11/21</a:t>
             </a:fld>
             <a:endParaRPr lang="en-US"/>
           </a:p>
@@ -2077,7 +2079,7 @@
           <a:p>
             <a:fld id="{B051A233-554D-9E4F-B676-5FA9AA940918}" type="datetimeFigureOut">
               <a:rPr lang="en-US" smtClean="0"/>
-              <a:t>8/7/21</a:t>
+              <a:t>8/11/21</a:t>
             </a:fld>
             <a:endParaRPr lang="en-US"/>
           </a:p>
@@ -2388,7 +2390,7 @@
           <a:p>
             <a:fld id="{B051A233-554D-9E4F-B676-5FA9AA940918}" type="datetimeFigureOut">
               <a:rPr lang="en-US" smtClean="0"/>
-              <a:t>8/7/21</a:t>
+              <a:t>8/11/21</a:t>
             </a:fld>
             <a:endParaRPr lang="en-US"/>
           </a:p>
@@ -2676,7 +2678,7 @@
           <a:p>
             <a:fld id="{B051A233-554D-9E4F-B676-5FA9AA940918}" type="datetimeFigureOut">
               <a:rPr lang="en-US" smtClean="0"/>
-              <a:t>8/7/21</a:t>
+              <a:t>8/11/21</a:t>
             </a:fld>
             <a:endParaRPr lang="en-US"/>
           </a:p>
@@ -2917,7 +2919,7 @@
           <a:p>
             <a:fld id="{B051A233-554D-9E4F-B676-5FA9AA940918}" type="datetimeFigureOut">
               <a:rPr lang="en-US" smtClean="0"/>
-              <a:t>8/7/21</a:t>
+              <a:t>8/11/21</a:t>
             </a:fld>
             <a:endParaRPr lang="en-US"/>
           </a:p>
@@ -3425,7 +3427,7 @@
           <p:cNvPr id="2" name="Title 1">
             <a:extLst>
               <a:ext uri="{FF2B5EF4-FFF2-40B4-BE49-F238E27FC236}">
-                <a16:creationId xmlns:a16="http://schemas.microsoft.com/office/drawing/2014/main" id="{DA08D987-354F-C044-9E19-15B3BFDF3E4F}"/>
+                <a16:creationId xmlns:a16="http://schemas.microsoft.com/office/drawing/2014/main" id="{75FA4B68-C6AB-E94A-A7FC-90D53754287B}"/>
               </a:ext>
             </a:extLst>
           </p:cNvPr>
@@ -3441,7 +3443,10 @@
           <a:bodyPr/>
           <a:lstStyle/>
           <a:p>
-            <a:endParaRPr lang="en-US"/>
+            <a:r>
+              <a:rPr lang="en-US" dirty="0"/>
+              <a:t>Invocation verification</a:t>
+            </a:r>
           </a:p>
         </p:txBody>
       </p:sp>
@@ -3450,7 +3455,7 @@
           <p:cNvPr id="3" name="Content Placeholder 2">
             <a:extLst>
               <a:ext uri="{FF2B5EF4-FFF2-40B4-BE49-F238E27FC236}">
-                <a16:creationId xmlns:a16="http://schemas.microsoft.com/office/drawing/2014/main" id="{B04669A6-B827-CC4A-91AA-6FA41E150FE4}"/>
+                <a16:creationId xmlns:a16="http://schemas.microsoft.com/office/drawing/2014/main" id="{689D557A-651B-7C42-A5B9-0B87CB3CD723}"/>
               </a:ext>
             </a:extLst>
           </p:cNvPr>
@@ -3466,14 +3471,54 @@
           <a:bodyPr/>
           <a:lstStyle/>
           <a:p>
-            <a:endParaRPr lang="en-US"/>
+            <a:r>
+              <a:rPr lang="en-US" dirty="0"/>
+              <a:t>Spies and mocks capture invocations and these invocations can then later be verified in the unit test.</a:t>
+            </a:r>
+          </a:p>
+          <a:p>
+            <a:r>
+              <a:rPr lang="en-US" dirty="0"/>
+              <a:t>Frameworks provide assertions for verifying invocations on spies and mocks.</a:t>
+            </a:r>
+          </a:p>
+          <a:p>
+            <a:r>
+              <a:rPr lang="en-US" dirty="0"/>
+              <a:t>Using invocation verification opens up the door to more unit test possibilities.</a:t>
+            </a:r>
+          </a:p>
+          <a:p>
+            <a:pPr lvl="1"/>
+            <a:r>
+              <a:rPr lang="en-US" dirty="0"/>
+              <a:t>Allows the developer access to indirect outputs that are normally difficult to capture.</a:t>
+            </a:r>
+          </a:p>
+          <a:p>
+            <a:r>
+              <a:rPr lang="en-US" dirty="0"/>
+              <a:t>Be careful with this sort of testing. </a:t>
+            </a:r>
+          </a:p>
+          <a:p>
+            <a:pPr lvl="1"/>
+            <a:r>
+              <a:rPr lang="en-US" dirty="0"/>
+              <a:t>It needs to be used with some sort of </a:t>
+            </a:r>
+            <a:r>
+              <a:rPr lang="en-US"/>
+              <a:t>integrated testing.</a:t>
+            </a:r>
+            <a:endParaRPr lang="en-US" dirty="0"/>
           </a:p>
         </p:txBody>
       </p:sp>
     </p:spTree>
     <p:extLst>
       <p:ext uri="{BB962C8B-B14F-4D97-AF65-F5344CB8AC3E}">
-        <p14:creationId xmlns:p14="http://schemas.microsoft.com/office/powerpoint/2010/main" val="1744381386"/>
+        <p14:creationId xmlns:p14="http://schemas.microsoft.com/office/powerpoint/2010/main" val="1630151755"/>
       </p:ext>
     </p:extLst>
   </p:cSld>
@@ -3484,246 +3529,6 @@
 </file>
 
 <file path=ppt/slides/slide11.xml><?xml version="1.0" encoding="utf-8"?>
-<p:sld xmlns:a="http://schemas.openxmlformats.org/drawingml/2006/main" xmlns:r="http://schemas.openxmlformats.org/officeDocument/2006/relationships" xmlns:p="http://schemas.openxmlformats.org/presentationml/2006/main">
-  <p:cSld>
-    <p:spTree>
-      <p:nvGrpSpPr>
-        <p:cNvPr id="1" name=""/>
-        <p:cNvGrpSpPr/>
-        <p:nvPr/>
-      </p:nvGrpSpPr>
-      <p:grpSpPr>
-        <a:xfrm>
-          <a:off x="0" y="0"/>
-          <a:ext cx="0" cy="0"/>
-          <a:chOff x="0" y="0"/>
-          <a:chExt cx="0" cy="0"/>
-        </a:xfrm>
-      </p:grpSpPr>
-      <p:sp>
-        <p:nvSpPr>
-          <p:cNvPr id="2" name="Title 1">
-            <a:extLst>
-              <a:ext uri="{FF2B5EF4-FFF2-40B4-BE49-F238E27FC236}">
-                <a16:creationId xmlns:a16="http://schemas.microsoft.com/office/drawing/2014/main" id="{08FCD081-FD70-414D-A926-40E98E266BD5}"/>
-              </a:ext>
-            </a:extLst>
-          </p:cNvPr>
-          <p:cNvSpPr>
-            <a:spLocks noGrp="1"/>
-          </p:cNvSpPr>
-          <p:nvPr>
-            <p:ph type="title"/>
-          </p:nvPr>
-        </p:nvSpPr>
-        <p:spPr/>
-        <p:txBody>
-          <a:bodyPr/>
-          <a:lstStyle/>
-          <a:p>
-            <a:endParaRPr lang="en-US"/>
-          </a:p>
-        </p:txBody>
-      </p:sp>
-      <p:sp>
-        <p:nvSpPr>
-          <p:cNvPr id="3" name="Content Placeholder 2">
-            <a:extLst>
-              <a:ext uri="{FF2B5EF4-FFF2-40B4-BE49-F238E27FC236}">
-                <a16:creationId xmlns:a16="http://schemas.microsoft.com/office/drawing/2014/main" id="{BA013A3B-7DD8-104A-B6E1-58D43FBC687A}"/>
-              </a:ext>
-            </a:extLst>
-          </p:cNvPr>
-          <p:cNvSpPr>
-            <a:spLocks noGrp="1"/>
-          </p:cNvSpPr>
-          <p:nvPr>
-            <p:ph idx="1"/>
-          </p:nvPr>
-        </p:nvSpPr>
-        <p:spPr/>
-        <p:txBody>
-          <a:bodyPr/>
-          <a:lstStyle/>
-          <a:p>
-            <a:endParaRPr lang="en-US"/>
-          </a:p>
-        </p:txBody>
-      </p:sp>
-    </p:spTree>
-    <p:extLst>
-      <p:ext uri="{BB962C8B-B14F-4D97-AF65-F5344CB8AC3E}">
-        <p14:creationId xmlns:p14="http://schemas.microsoft.com/office/powerpoint/2010/main" val="759973929"/>
-      </p:ext>
-    </p:extLst>
-  </p:cSld>
-  <p:clrMapOvr>
-    <a:masterClrMapping/>
-  </p:clrMapOvr>
-</p:sld>
-</file>
-
-<file path=ppt/slides/slide12.xml><?xml version="1.0" encoding="utf-8"?>
-<p:sld xmlns:a="http://schemas.openxmlformats.org/drawingml/2006/main" xmlns:r="http://schemas.openxmlformats.org/officeDocument/2006/relationships" xmlns:p="http://schemas.openxmlformats.org/presentationml/2006/main">
-  <p:cSld>
-    <p:spTree>
-      <p:nvGrpSpPr>
-        <p:cNvPr id="1" name=""/>
-        <p:cNvGrpSpPr/>
-        <p:nvPr/>
-      </p:nvGrpSpPr>
-      <p:grpSpPr>
-        <a:xfrm>
-          <a:off x="0" y="0"/>
-          <a:ext cx="0" cy="0"/>
-          <a:chOff x="0" y="0"/>
-          <a:chExt cx="0" cy="0"/>
-        </a:xfrm>
-      </p:grpSpPr>
-      <p:sp>
-        <p:nvSpPr>
-          <p:cNvPr id="2" name="Title 1">
-            <a:extLst>
-              <a:ext uri="{FF2B5EF4-FFF2-40B4-BE49-F238E27FC236}">
-                <a16:creationId xmlns:a16="http://schemas.microsoft.com/office/drawing/2014/main" id="{74296428-BDF2-1548-A328-E17C4C622C3A}"/>
-              </a:ext>
-            </a:extLst>
-          </p:cNvPr>
-          <p:cNvSpPr>
-            <a:spLocks noGrp="1"/>
-          </p:cNvSpPr>
-          <p:nvPr>
-            <p:ph type="title"/>
-          </p:nvPr>
-        </p:nvSpPr>
-        <p:spPr/>
-        <p:txBody>
-          <a:bodyPr/>
-          <a:lstStyle/>
-          <a:p>
-            <a:endParaRPr lang="en-US"/>
-          </a:p>
-        </p:txBody>
-      </p:sp>
-      <p:sp>
-        <p:nvSpPr>
-          <p:cNvPr id="3" name="Content Placeholder 2">
-            <a:extLst>
-              <a:ext uri="{FF2B5EF4-FFF2-40B4-BE49-F238E27FC236}">
-                <a16:creationId xmlns:a16="http://schemas.microsoft.com/office/drawing/2014/main" id="{4C2D1923-A067-7240-B562-3FA359A98EC5}"/>
-              </a:ext>
-            </a:extLst>
-          </p:cNvPr>
-          <p:cNvSpPr>
-            <a:spLocks noGrp="1"/>
-          </p:cNvSpPr>
-          <p:nvPr>
-            <p:ph idx="1"/>
-          </p:nvPr>
-        </p:nvSpPr>
-        <p:spPr/>
-        <p:txBody>
-          <a:bodyPr/>
-          <a:lstStyle/>
-          <a:p>
-            <a:endParaRPr lang="en-US"/>
-          </a:p>
-        </p:txBody>
-      </p:sp>
-    </p:spTree>
-    <p:extLst>
-      <p:ext uri="{BB962C8B-B14F-4D97-AF65-F5344CB8AC3E}">
-        <p14:creationId xmlns:p14="http://schemas.microsoft.com/office/powerpoint/2010/main" val="203820366"/>
-      </p:ext>
-    </p:extLst>
-  </p:cSld>
-  <p:clrMapOvr>
-    <a:masterClrMapping/>
-  </p:clrMapOvr>
-</p:sld>
-</file>
-
-<file path=ppt/slides/slide13.xml><?xml version="1.0" encoding="utf-8"?>
-<p:sld xmlns:a="http://schemas.openxmlformats.org/drawingml/2006/main" xmlns:r="http://schemas.openxmlformats.org/officeDocument/2006/relationships" xmlns:p="http://schemas.openxmlformats.org/presentationml/2006/main">
-  <p:cSld>
-    <p:spTree>
-      <p:nvGrpSpPr>
-        <p:cNvPr id="1" name=""/>
-        <p:cNvGrpSpPr/>
-        <p:nvPr/>
-      </p:nvGrpSpPr>
-      <p:grpSpPr>
-        <a:xfrm>
-          <a:off x="0" y="0"/>
-          <a:ext cx="0" cy="0"/>
-          <a:chOff x="0" y="0"/>
-          <a:chExt cx="0" cy="0"/>
-        </a:xfrm>
-      </p:grpSpPr>
-      <p:sp>
-        <p:nvSpPr>
-          <p:cNvPr id="2" name="Title 1">
-            <a:extLst>
-              <a:ext uri="{FF2B5EF4-FFF2-40B4-BE49-F238E27FC236}">
-                <a16:creationId xmlns:a16="http://schemas.microsoft.com/office/drawing/2014/main" id="{E9BCFAF7-4608-E54E-A5F6-6664E64BD63C}"/>
-              </a:ext>
-            </a:extLst>
-          </p:cNvPr>
-          <p:cNvSpPr>
-            <a:spLocks noGrp="1"/>
-          </p:cNvSpPr>
-          <p:nvPr>
-            <p:ph type="title"/>
-          </p:nvPr>
-        </p:nvSpPr>
-        <p:spPr/>
-        <p:txBody>
-          <a:bodyPr/>
-          <a:lstStyle/>
-          <a:p>
-            <a:endParaRPr lang="en-US"/>
-          </a:p>
-        </p:txBody>
-      </p:sp>
-      <p:sp>
-        <p:nvSpPr>
-          <p:cNvPr id="3" name="Content Placeholder 2">
-            <a:extLst>
-              <a:ext uri="{FF2B5EF4-FFF2-40B4-BE49-F238E27FC236}">
-                <a16:creationId xmlns:a16="http://schemas.microsoft.com/office/drawing/2014/main" id="{50BC1F65-1FF8-9644-B1FD-BA3BC78697F4}"/>
-              </a:ext>
-            </a:extLst>
-          </p:cNvPr>
-          <p:cNvSpPr>
-            <a:spLocks noGrp="1"/>
-          </p:cNvSpPr>
-          <p:nvPr>
-            <p:ph idx="1"/>
-          </p:nvPr>
-        </p:nvSpPr>
-        <p:spPr/>
-        <p:txBody>
-          <a:bodyPr/>
-          <a:lstStyle/>
-          <a:p>
-            <a:endParaRPr lang="en-US"/>
-          </a:p>
-        </p:txBody>
-      </p:sp>
-    </p:spTree>
-    <p:extLst>
-      <p:ext uri="{BB962C8B-B14F-4D97-AF65-F5344CB8AC3E}">
-        <p14:creationId xmlns:p14="http://schemas.microsoft.com/office/powerpoint/2010/main" val="716888490"/>
-      </p:ext>
-    </p:extLst>
-  </p:cSld>
-  <p:clrMapOvr>
-    <a:masterClrMapping/>
-  </p:clrMapOvr>
-</p:sld>
-</file>
-
-<file path=ppt/slides/slide14.xml><?xml version="1.0" encoding="utf-8"?>
 <p:sld xmlns:a="http://schemas.openxmlformats.org/drawingml/2006/main" xmlns:r="http://schemas.openxmlformats.org/officeDocument/2006/relationships" xmlns:p="http://schemas.openxmlformats.org/presentationml/2006/main">
   <p:cSld>
     <p:spTree>
@@ -3933,7 +3738,7 @@
           <a:p>
             <a:r>
               <a:rPr lang="en-US" dirty="0"/>
-              <a:t>In automated unit testing, it may be necessary to use objects or procedures that look and behave like their release-intended counterparts, but are actually simplified versions that reduce the complexity and facilitate testing. </a:t>
+              <a:t>In automated unit testing, it may be necessary to use objects or functions that look and behave like their release-intended counterparts, but are actually simplified versions that help facilitate your testing efforts. </a:t>
             </a:r>
           </a:p>
           <a:p>
@@ -3947,7 +3752,7 @@
             </a:r>
             <a:r>
               <a:rPr lang="en-US" dirty="0"/>
-              <a:t> is a generic term used for these objects or procedures.</a:t>
+              <a:t> is a generic term used for these objects or functions.</a:t>
             </a:r>
           </a:p>
           <a:p>
@@ -4050,13 +3855,13 @@
             <a:pPr lvl="1"/>
             <a:r>
               <a:rPr lang="en-US" dirty="0"/>
-              <a:t>Use test doubles to uncouple units for this sort of testing.</a:t>
-            </a:r>
-          </a:p>
-          <a:p>
-            <a:r>
-              <a:rPr lang="en-US" dirty="0"/>
-              <a:t>Speeds tests up due to replacing slow dependencies (databases, message queues, etc.) with faster fake implementations.</a:t>
+              <a:t>Use test doubles to uncouple units.</a:t>
+            </a:r>
+          </a:p>
+          <a:p>
+            <a:r>
+              <a:rPr lang="en-US" dirty="0"/>
+              <a:t>Speeds up your tests by replacing slow dependencies (databases, message queues, etc.) with faster fake implementations.</a:t>
             </a:r>
           </a:p>
           <a:p>
@@ -4220,7 +4025,7 @@
           <p:cNvPr id="2" name="Title 1">
             <a:extLst>
               <a:ext uri="{FF2B5EF4-FFF2-40B4-BE49-F238E27FC236}">
-                <a16:creationId xmlns:a16="http://schemas.microsoft.com/office/drawing/2014/main" id="{3066220D-7BA7-5F40-9353-22734B4A8F13}"/>
+                <a16:creationId xmlns:a16="http://schemas.microsoft.com/office/drawing/2014/main" id="{865B1D09-9A9F-B246-8D11-BCA98FA5DFE9}"/>
               </a:ext>
             </a:extLst>
           </p:cNvPr>
@@ -4238,7 +4043,7 @@
           <a:p>
             <a:r>
               <a:rPr lang="en-US" dirty="0"/>
-              <a:t>Spies</a:t>
+              <a:t>Fake objects</a:t>
             </a:r>
           </a:p>
         </p:txBody>
@@ -4248,7 +4053,7 @@
           <p:cNvPr id="3" name="Content Placeholder 2">
             <a:extLst>
               <a:ext uri="{FF2B5EF4-FFF2-40B4-BE49-F238E27FC236}">
-                <a16:creationId xmlns:a16="http://schemas.microsoft.com/office/drawing/2014/main" id="{C44BE642-BAA0-154B-A76F-6ACAA74254C5}"/>
+                <a16:creationId xmlns:a16="http://schemas.microsoft.com/office/drawing/2014/main" id="{2826CF1A-4419-5249-8B14-2A6DFE29D34A}"/>
               </a:ext>
             </a:extLst>
           </p:cNvPr>
@@ -4266,64 +4071,20 @@
           <a:p>
             <a:r>
               <a:rPr lang="en-US" dirty="0"/>
-              <a:t>A more capable version of a test stub, a spy provides an </a:t>
-            </a:r>
-            <a:r>
-              <a:rPr lang="en-US" i="1" dirty="0"/>
-              <a:t>observation point</a:t>
-            </a:r>
-            <a:r>
-              <a:rPr lang="en-US" dirty="0"/>
-              <a:t> for </a:t>
-            </a:r>
-            <a:r>
-              <a:rPr lang="en-US" i="1" dirty="0"/>
-              <a:t>indirect outputs </a:t>
-            </a:r>
-            <a:r>
-              <a:rPr lang="en-US" dirty="0"/>
-              <a:t>of the SUT.</a:t>
+              <a:t>A simpler implementation of the real dependency.</a:t>
             </a:r>
           </a:p>
           <a:p>
             <a:pPr lvl="1"/>
             <a:r>
               <a:rPr lang="en-US" dirty="0"/>
-              <a:t>Argument capture and invocation recording</a:t>
-            </a:r>
-          </a:p>
-          <a:p>
-            <a:pPr lvl="1"/>
-            <a:r>
-              <a:rPr lang="en-US" dirty="0"/>
-              <a:t>Loose vs. exact argument matchers</a:t>
-            </a:r>
-          </a:p>
-          <a:p>
-            <a:r>
-              <a:rPr lang="en-US" dirty="0"/>
-              <a:t>A spy captures the indirect outputs of the SUT and can be later used for dependency invocation verification in the test.</a:t>
-            </a:r>
-          </a:p>
-          <a:p>
-            <a:r>
-              <a:rPr lang="en-US" dirty="0"/>
-              <a:t> Still retains the ability to control the </a:t>
-            </a:r>
-            <a:r>
-              <a:rPr lang="en-US" i="1" dirty="0"/>
-              <a:t>indirect inputs </a:t>
-            </a:r>
-            <a:r>
-              <a:rPr lang="en-US" dirty="0"/>
-              <a:t>of the SUT</a:t>
-            </a:r>
-          </a:p>
-          <a:p>
-            <a:pPr lvl="1"/>
-            <a:r>
-              <a:rPr lang="en-US" dirty="0"/>
-              <a:t>Specify that the spy return values or raise exceptions.</a:t>
+              <a:t>Example: In-memory database JPA repositories instead of the enterprise database system JPA repositories.</a:t>
+            </a:r>
+          </a:p>
+          <a:p>
+            <a:r>
+              <a:rPr lang="en-US" dirty="0"/>
+              <a:t>Used when real dependencies are slow or hard to control for testing.</a:t>
             </a:r>
           </a:p>
         </p:txBody>
@@ -4331,7 +4092,7 @@
     </p:spTree>
     <p:extLst>
       <p:ext uri="{BB962C8B-B14F-4D97-AF65-F5344CB8AC3E}">
-        <p14:creationId xmlns:p14="http://schemas.microsoft.com/office/powerpoint/2010/main" val="469290806"/>
+        <p14:creationId xmlns:p14="http://schemas.microsoft.com/office/powerpoint/2010/main" val="4282244646"/>
       </p:ext>
     </p:extLst>
   </p:cSld>
@@ -4363,7 +4124,7 @@
           <p:cNvPr id="2" name="Title 1">
             <a:extLst>
               <a:ext uri="{FF2B5EF4-FFF2-40B4-BE49-F238E27FC236}">
-                <a16:creationId xmlns:a16="http://schemas.microsoft.com/office/drawing/2014/main" id="{E1A236F9-60E0-A344-AB34-8B344A077F49}"/>
+                <a16:creationId xmlns:a16="http://schemas.microsoft.com/office/drawing/2014/main" id="{3066220D-7BA7-5F40-9353-22734B4A8F13}"/>
               </a:ext>
             </a:extLst>
           </p:cNvPr>
@@ -4381,7 +4142,7 @@
           <a:p>
             <a:r>
               <a:rPr lang="en-US" dirty="0"/>
-              <a:t>Mocks</a:t>
+              <a:t>Spies</a:t>
             </a:r>
           </a:p>
         </p:txBody>
@@ -4391,7 +4152,7 @@
           <p:cNvPr id="3" name="Content Placeholder 2">
             <a:extLst>
               <a:ext uri="{FF2B5EF4-FFF2-40B4-BE49-F238E27FC236}">
-                <a16:creationId xmlns:a16="http://schemas.microsoft.com/office/drawing/2014/main" id="{C2F9150C-EB75-2845-B42F-78E8179F9B67}"/>
+                <a16:creationId xmlns:a16="http://schemas.microsoft.com/office/drawing/2014/main" id="{C44BE642-BAA0-154B-A76F-6ACAA74254C5}"/>
               </a:ext>
             </a:extLst>
           </p:cNvPr>
@@ -4409,7 +4170,7 @@
           <a:p>
             <a:r>
               <a:rPr lang="en-US" dirty="0"/>
-              <a:t>Similar to a spy, a mock object provides an </a:t>
+              <a:t>A more capable version of a test stub, a spy provides an </a:t>
             </a:r>
             <a:r>
               <a:rPr lang="en-US" i="1" dirty="0"/>
@@ -4429,26 +4190,52 @@
             </a:r>
           </a:p>
           <a:p>
-            <a:r>
-              <a:rPr lang="en-US" dirty="0"/>
-              <a:t>The focus with mock objects is on invocation verification. </a:t>
-            </a:r>
-          </a:p>
-          <a:p>
-            <a:r>
-              <a:rPr lang="en-US" dirty="0"/>
-              <a:t>Personally I don’t see much difference between mock objects and spies, but you will see both terms in the wild.</a:t>
-            </a:r>
-          </a:p>
-          <a:p>
-            <a:endParaRPr lang="en-US" dirty="0"/>
+            <a:pPr lvl="1"/>
+            <a:r>
+              <a:rPr lang="en-US" dirty="0"/>
+              <a:t>Argument capture and invocation recording</a:t>
+            </a:r>
+          </a:p>
+          <a:p>
+            <a:pPr lvl="1"/>
+            <a:r>
+              <a:rPr lang="en-US" dirty="0"/>
+              <a:t>Loose vs. exact argument matchers</a:t>
+            </a:r>
+          </a:p>
+          <a:p>
+            <a:r>
+              <a:rPr lang="en-US" dirty="0"/>
+              <a:t>A spy captures the indirect outputs of the SUT and can be later used for dependency invocation verification in the test.</a:t>
+            </a:r>
+          </a:p>
+          <a:p>
+            <a:r>
+              <a:rPr lang="en-US" dirty="0"/>
+              <a:t> Still retains the ability to control the </a:t>
+            </a:r>
+            <a:r>
+              <a:rPr lang="en-US" i="1" dirty="0"/>
+              <a:t>indirect inputs </a:t>
+            </a:r>
+            <a:r>
+              <a:rPr lang="en-US" dirty="0"/>
+              <a:t>of the SUT</a:t>
+            </a:r>
+          </a:p>
+          <a:p>
+            <a:pPr lvl="1"/>
+            <a:r>
+              <a:rPr lang="en-US" dirty="0"/>
+              <a:t>Specify that the spy return values or raise exceptions.</a:t>
+            </a:r>
           </a:p>
         </p:txBody>
       </p:sp>
     </p:spTree>
     <p:extLst>
       <p:ext uri="{BB962C8B-B14F-4D97-AF65-F5344CB8AC3E}">
-        <p14:creationId xmlns:p14="http://schemas.microsoft.com/office/powerpoint/2010/main" val="3880316596"/>
+        <p14:creationId xmlns:p14="http://schemas.microsoft.com/office/powerpoint/2010/main" val="469290806"/>
       </p:ext>
     </p:extLst>
   </p:cSld>
@@ -4480,7 +4267,7 @@
           <p:cNvPr id="2" name="Title 1">
             <a:extLst>
               <a:ext uri="{FF2B5EF4-FFF2-40B4-BE49-F238E27FC236}">
-                <a16:creationId xmlns:a16="http://schemas.microsoft.com/office/drawing/2014/main" id="{865B1D09-9A9F-B246-8D11-BCA98FA5DFE9}"/>
+                <a16:creationId xmlns:a16="http://schemas.microsoft.com/office/drawing/2014/main" id="{E1A236F9-60E0-A344-AB34-8B344A077F49}"/>
               </a:ext>
             </a:extLst>
           </p:cNvPr>
@@ -4498,7 +4285,7 @@
           <a:p>
             <a:r>
               <a:rPr lang="en-US" dirty="0"/>
-              <a:t>Fake objects</a:t>
+              <a:t>Mocks</a:t>
             </a:r>
           </a:p>
         </p:txBody>
@@ -4508,7 +4295,7 @@
           <p:cNvPr id="3" name="Content Placeholder 2">
             <a:extLst>
               <a:ext uri="{FF2B5EF4-FFF2-40B4-BE49-F238E27FC236}">
-                <a16:creationId xmlns:a16="http://schemas.microsoft.com/office/drawing/2014/main" id="{2826CF1A-4419-5249-8B14-2A6DFE29D34A}"/>
+                <a16:creationId xmlns:a16="http://schemas.microsoft.com/office/drawing/2014/main" id="{C2F9150C-EB75-2845-B42F-78E8179F9B67}"/>
               </a:ext>
             </a:extLst>
           </p:cNvPr>
@@ -4526,28 +4313,46 @@
           <a:p>
             <a:r>
               <a:rPr lang="en-US" dirty="0"/>
-              <a:t>A simpler implementation of the real dependency.</a:t>
-            </a:r>
-          </a:p>
-          <a:p>
-            <a:pPr lvl="1"/>
-            <a:r>
-              <a:rPr lang="en-US" dirty="0"/>
-              <a:t>Example: In-memory database JPA repositories instead of the enterprise database system JPA repositories.</a:t>
-            </a:r>
-          </a:p>
-          <a:p>
-            <a:r>
-              <a:rPr lang="en-US" dirty="0"/>
-              <a:t>Used when real dependencies are slow or hard to control for testing.</a:t>
-            </a:r>
+              <a:t>Similar to a spy, a mock object provides an </a:t>
+            </a:r>
+            <a:r>
+              <a:rPr lang="en-US" i="1" dirty="0"/>
+              <a:t>observation point</a:t>
+            </a:r>
+            <a:r>
+              <a:rPr lang="en-US" dirty="0"/>
+              <a:t> for </a:t>
+            </a:r>
+            <a:r>
+              <a:rPr lang="en-US" i="1" dirty="0"/>
+              <a:t>indirect outputs </a:t>
+            </a:r>
+            <a:r>
+              <a:rPr lang="en-US" dirty="0"/>
+              <a:t>of the SUT.</a:t>
+            </a:r>
+          </a:p>
+          <a:p>
+            <a:r>
+              <a:rPr lang="en-US" dirty="0"/>
+              <a:t>The focus with mock objects is on invocation verification. </a:t>
+            </a:r>
+          </a:p>
+          <a:p>
+            <a:r>
+              <a:rPr lang="en-US" dirty="0"/>
+              <a:t>Personally I don’t see much difference between mock objects and spies, but you will see both terms in the wild.</a:t>
+            </a:r>
+          </a:p>
+          <a:p>
+            <a:endParaRPr lang="en-US" dirty="0"/>
           </a:p>
         </p:txBody>
       </p:sp>
     </p:spTree>
     <p:extLst>
       <p:ext uri="{BB962C8B-B14F-4D97-AF65-F5344CB8AC3E}">
-        <p14:creationId xmlns:p14="http://schemas.microsoft.com/office/powerpoint/2010/main" val="4282244646"/>
+        <p14:creationId xmlns:p14="http://schemas.microsoft.com/office/powerpoint/2010/main" val="3880316596"/>
       </p:ext>
     </p:extLst>
   </p:cSld>
@@ -4595,7 +4400,10 @@
           <a:bodyPr/>
           <a:lstStyle/>
           <a:p>
-            <a:endParaRPr lang="en-US"/>
+            <a:r>
+              <a:rPr lang="en-US" dirty="0"/>
+              <a:t>Argument matching</a:t>
+            </a:r>
           </a:p>
         </p:txBody>
       </p:sp>
@@ -4620,7 +4428,46 @@
           <a:bodyPr/>
           <a:lstStyle/>
           <a:p>
-            <a:endParaRPr lang="en-US"/>
+            <a:r>
+              <a:rPr lang="en-US" dirty="0"/>
+              <a:t>When using mocks and spies, it is important to assert that the correct arguments are being passed to the method calls.</a:t>
+            </a:r>
+          </a:p>
+          <a:p>
+            <a:r>
+              <a:rPr lang="en-US" dirty="0"/>
+              <a:t>Mock object frameworks come with argument matchers that help with this assertion.</a:t>
+            </a:r>
+          </a:p>
+          <a:p>
+            <a:pPr lvl="1"/>
+            <a:r>
+              <a:rPr lang="en-US" dirty="0"/>
+              <a:t>Some frameworks (Mockito) can be quirky about how argument matching is used.</a:t>
+            </a:r>
+          </a:p>
+          <a:p>
+            <a:r>
+              <a:rPr lang="en-US" dirty="0"/>
+              <a:t>Allows for lenient or strict matching.</a:t>
+            </a:r>
+          </a:p>
+          <a:p>
+            <a:pPr lvl="1"/>
+            <a:r>
+              <a:rPr lang="en-US" dirty="0"/>
+              <a:t>Frameworks provide argument matchers out of the box for most needs.</a:t>
+            </a:r>
+          </a:p>
+          <a:p>
+            <a:pPr lvl="1"/>
+            <a:r>
+              <a:rPr lang="en-US" dirty="0"/>
+              <a:t>Framework provide the ability to create custom argument matchers if needed.</a:t>
+            </a:r>
+          </a:p>
+          <a:p>
+            <a:endParaRPr lang="en-US" dirty="0"/>
           </a:p>
         </p:txBody>
       </p:sp>
@@ -4675,7 +4522,10 @@
           <a:bodyPr/>
           <a:lstStyle/>
           <a:p>
-            <a:endParaRPr lang="en-US"/>
+            <a:r>
+              <a:rPr lang="en-US" dirty="0"/>
+              <a:t>Argument capture</a:t>
+            </a:r>
           </a:p>
         </p:txBody>
       </p:sp>
@@ -4700,7 +4550,94 @@
           <a:bodyPr/>
           <a:lstStyle/>
           <a:p>
-            <a:endParaRPr lang="en-US"/>
+            <a:r>
+              <a:rPr lang="en-US" dirty="0"/>
+              <a:t>A specialized type of argument matching.</a:t>
+            </a:r>
+          </a:p>
+          <a:p>
+            <a:r>
+              <a:rPr lang="en-US" dirty="0"/>
+              <a:t>Captures the indirect output to the mocked dependency.</a:t>
+            </a:r>
+          </a:p>
+          <a:p>
+            <a:pPr lvl="1"/>
+            <a:r>
+              <a:rPr lang="en-US" dirty="0"/>
+              <a:t>The captured argument is then available to the unit test for further verification.</a:t>
+            </a:r>
+          </a:p>
+          <a:p>
+            <a:r>
+              <a:rPr lang="en-US" dirty="0"/>
+              <a:t>Mocking frameworks may provide this.</a:t>
+            </a:r>
+          </a:p>
+          <a:p>
+            <a:pPr lvl="1"/>
+            <a:r>
+              <a:rPr lang="en-US" dirty="0"/>
+              <a:t>Mockito provides the </a:t>
+            </a:r>
+            <a:r>
+              <a:rPr lang="en-US" sz="2000" dirty="0" err="1">
+                <a:latin typeface="JetBrains Mono NL" panose="02000009000000000000" pitchFamily="49" charset="0"/>
+                <a:cs typeface="JetBrains Mono NL" panose="02000009000000000000" pitchFamily="49" charset="0"/>
+              </a:rPr>
+              <a:t>ArgumentCaptor</a:t>
+            </a:r>
+            <a:r>
+              <a:rPr lang="en-US" sz="2000" dirty="0">
+                <a:latin typeface="JetBrains Mono NL" panose="02000009000000000000" pitchFamily="49" charset="0"/>
+                <a:cs typeface="JetBrains Mono NL" panose="02000009000000000000" pitchFamily="49" charset="0"/>
+              </a:rPr>
+              <a:t>&lt;T&gt;</a:t>
+            </a:r>
+            <a:r>
+              <a:rPr lang="en-US" dirty="0"/>
+              <a:t> class and </a:t>
+            </a:r>
+            <a:r>
+              <a:rPr lang="en-US" sz="2000" dirty="0">
+                <a:latin typeface="JetBrains Mono NL" panose="02000009000000000000" pitchFamily="49" charset="0"/>
+                <a:cs typeface="JetBrains Mono NL" panose="02000009000000000000" pitchFamily="49" charset="0"/>
+              </a:rPr>
+              <a:t>@Captor</a:t>
+            </a:r>
+            <a:r>
+              <a:rPr lang="en-US" dirty="0"/>
+              <a:t> annotation for this purpose.</a:t>
+            </a:r>
+          </a:p>
+          <a:p>
+            <a:pPr lvl="1"/>
+            <a:r>
+              <a:rPr lang="en-US" dirty="0"/>
+              <a:t>Jasmine provides </a:t>
+            </a:r>
+            <a:r>
+              <a:rPr lang="en-US" sz="2000" dirty="0" err="1">
+                <a:latin typeface="JetBrains Mono NL" panose="02000009000000000000" pitchFamily="49" charset="0"/>
+                <a:cs typeface="JetBrains Mono NL" panose="02000009000000000000" pitchFamily="49" charset="0"/>
+              </a:rPr>
+              <a:t>mostRecentCall.args</a:t>
+            </a:r>
+            <a:r>
+              <a:rPr lang="en-US" dirty="0"/>
+              <a:t> and </a:t>
+            </a:r>
+            <a:r>
+              <a:rPr lang="en-US" sz="2000" dirty="0" err="1">
+                <a:latin typeface="JetBrains Mono NL" panose="02000009000000000000" pitchFamily="49" charset="0"/>
+                <a:cs typeface="JetBrains Mono NL" panose="02000009000000000000" pitchFamily="49" charset="0"/>
+              </a:rPr>
+              <a:t>argsForCall</a:t>
+            </a:r>
+            <a:r>
+              <a:rPr lang="en-US" dirty="0"/>
+              <a:t> arrays on spied functions for this purpose.</a:t>
+            </a:r>
           </a:p>
         </p:txBody>
       </p:sp>

</xml_diff>

<commit_message>
Test Doubles presentation updates
</commit_message>
<xml_diff>
--- a/presentations/Test Doubles.pptx
+++ b/presentations/Test Doubles.pptx
@@ -120,6 +120,18 @@
     </p:ext>
   </p:extLst>
 </p:presentation>
+</file>
+
+<file path=ppt/commentAuthors.xml><?xml version="1.0" encoding="utf-8"?>
+<p:cmAuthorLst xmlns:a="http://schemas.openxmlformats.org/drawingml/2006/main" xmlns:r="http://schemas.openxmlformats.org/officeDocument/2006/relationships" xmlns:p="http://schemas.openxmlformats.org/presentationml/2006/main">
+  <p:cmAuthor id="1" name="Bartling, Christopher" initials="BC" lastIdx="1" clrIdx="0">
+    <p:extLst>
+      <p:ext uri="{19B8F6BF-5375-455C-9EA6-DF929625EA0E}">
+        <p15:presenceInfo xmlns:p15="http://schemas.microsoft.com/office/powerpoint/2012/main" userId="S::christopher_bartling@optum.com::ce699388-1e48-434d-b0fe-15bbad6106c8" providerId="AD"/>
+      </p:ext>
+    </p:extLst>
+  </p:cmAuthor>
+</p:cmAuthorLst>
 </file>
 
 <file path=ppt/slideLayouts/slideLayout1.xml><?xml version="1.0" encoding="utf-8"?>

</xml_diff>